<commit_message>
fixed only clean on anchor tag
</commit_message>
<xml_diff>
--- a/Deliverables/outline-presentation.pptx
+++ b/Deliverables/outline-presentation.pptx
@@ -5,17 +5,16 @@
     <p:sldMasterId id="2147483648" r:id="rId1"/>
   </p:sldMasterIdLst>
   <p:notesMasterIdLst>
-    <p:notesMasterId r:id="rId10"/>
+    <p:notesMasterId r:id="rId9"/>
   </p:notesMasterIdLst>
   <p:sldIdLst>
-    <p:sldId id="263" r:id="rId2"/>
-    <p:sldId id="256" r:id="rId3"/>
-    <p:sldId id="257" r:id="rId4"/>
-    <p:sldId id="262" r:id="rId5"/>
-    <p:sldId id="259" r:id="rId6"/>
-    <p:sldId id="258" r:id="rId7"/>
-    <p:sldId id="260" r:id="rId8"/>
-    <p:sldId id="261" r:id="rId9"/>
+    <p:sldId id="256" r:id="rId2"/>
+    <p:sldId id="257" r:id="rId3"/>
+    <p:sldId id="262" r:id="rId4"/>
+    <p:sldId id="259" r:id="rId5"/>
+    <p:sldId id="258" r:id="rId6"/>
+    <p:sldId id="260" r:id="rId7"/>
+    <p:sldId id="261" r:id="rId8"/>
   </p:sldIdLst>
   <p:sldSz cx="12192000" cy="6858000"/>
   <p:notesSz cx="6858000" cy="9144000"/>
@@ -6282,16 +6281,39 @@
               </a:defRPr>
             </a:pPr>
             <a:r>
-              <a:rPr lang="da-DK" sz="1400" b="0" i="0" u="none" strike="noStrike" baseline="0">
+              <a:rPr lang="da-DK" sz="1400" b="0" i="0" u="none" strike="noStrike" baseline="0" dirty="0">
                 <a:effectLst/>
               </a:rPr>
-              <a:t>Clean-t16-Average</a:t>
+              <a:t>Clean-t16</a:t>
+            </a:r>
+          </a:p>
+          <a:p>
+            <a:pPr>
+              <a:defRPr/>
+            </a:pPr>
+            <a:r>
+              <a:rPr lang="da-DK" sz="1400" b="0" i="0" u="none" strike="noStrike" baseline="0" dirty="0">
+                <a:effectLst/>
+              </a:rPr>
+              <a:t>-Average</a:t>
             </a:r>
             <a:r>
-              <a:rPr lang="da-DK" baseline="0"/>
-              <a:t> thoughput per client</a:t>
+              <a:rPr lang="da-DK" baseline="0" dirty="0"/>
+              <a:t> </a:t>
             </a:r>
-            <a:endParaRPr lang="da-DK"/>
+            <a:r>
+              <a:rPr lang="da-DK" baseline="0" dirty="0" err="1"/>
+              <a:t>thoughput</a:t>
+            </a:r>
+            <a:r>
+              <a:rPr lang="da-DK" baseline="0" dirty="0"/>
+              <a:t> per </a:t>
+            </a:r>
+            <a:r>
+              <a:rPr lang="da-DK" baseline="0" dirty="0" err="1"/>
+              <a:t>client</a:t>
+            </a:r>
+            <a:endParaRPr lang="da-DK" dirty="0"/>
           </a:p>
         </c:rich>
       </c:tx>
@@ -8560,6 +8582,8 @@
         <c:axId val="1197995215"/>
         <c:scaling>
           <c:orientation val="minMax"/>
+          <c:max val="1.04"/>
+          <c:min val="1"/>
         </c:scaling>
         <c:delete val="0"/>
         <c:axPos val="l"/>
@@ -11050,6 +11074,7 @@
         <c:axId val="1197995215"/>
         <c:scaling>
           <c:orientation val="minMax"/>
+          <c:min val="1"/>
         </c:scaling>
         <c:delete val="0"/>
         <c:axPos val="l"/>
@@ -12193,9 +12218,22 @@
               </a:defRPr>
             </a:pPr>
             <a:r>
-              <a:rPr lang="en-GB"/>
-              <a:t>Sum of time spent for all messages</a:t>
+              <a:rPr lang="en-GB" dirty="0"/>
+              <a:t>Sum of time spent for all messages,</a:t>
             </a:r>
+            <a:r>
+              <a:rPr lang="en-GB" baseline="0" dirty="0"/>
+              <a:t> </a:t>
+            </a:r>
+            <a:r>
+              <a:rPr lang="en-GB" baseline="0" dirty="0" err="1"/>
+              <a:t>dsize</a:t>
+            </a:r>
+            <a:r>
+              <a:rPr lang="en-GB" baseline="0" dirty="0"/>
+              <a:t>!=12</a:t>
+            </a:r>
+            <a:endParaRPr lang="en-GB" dirty="0"/>
           </a:p>
         </c:rich>
       </c:tx>
@@ -12868,7 +12906,7 @@
                   </c:numLit>
                 </c:val>
                 <c:smooth val="0"/>
-                <c:extLst>
+                <c:extLst xmlns:c15="http://schemas.microsoft.com/office/drawing/2012/chart">
                   <c:ext xmlns:c16="http://schemas.microsoft.com/office/drawing/2014/chart" uri="{C3380CC4-5D6E-409C-BE32-E72D297353CC}">
                     <c16:uniqueId val="{00000007-CA6A-4476-806B-7E2A3A233861}"/>
                   </c:ext>
@@ -21698,6 +21736,8 @@
         <c:axId val="1197995215"/>
         <c:scaling>
           <c:orientation val="minMax"/>
+          <c:max val="1.04"/>
+          <c:min val="1"/>
         </c:scaling>
         <c:delete val="0"/>
         <c:axPos val="l"/>
@@ -26686,6 +26726,8 @@
         <c:axId val="1197995215"/>
         <c:scaling>
           <c:orientation val="minMax"/>
+          <c:max val="1.04"/>
+          <c:min val="1"/>
         </c:scaling>
         <c:delete val="0"/>
         <c:axPos val="l"/>
@@ -26924,6 +26966,14 @@
           </a:p>
         </c:rich>
       </c:tx>
+      <c:layout>
+        <c:manualLayout>
+          <c:xMode val="edge"/>
+          <c:yMode val="edge"/>
+          <c:x val="0.1499662815859501"/>
+          <c:y val="4.8443914090249361E-2"/>
+        </c:manualLayout>
+      </c:layout>
       <c:overlay val="0"/>
       <c:spPr>
         <a:noFill/>
@@ -29189,6 +29239,7 @@
         <c:axId val="1197995215"/>
         <c:scaling>
           <c:orientation val="minMax"/>
+          <c:max val="1.04"/>
         </c:scaling>
         <c:delete val="0"/>
         <c:axPos val="l"/>
@@ -37235,7 +37286,7 @@
           <a:p>
             <a:fld id="{96C7E1DB-2C8C-49F7-92E6-0EDDD858558C}" type="datetimeFigureOut">
               <a:rPr lang="en-US" smtClean="0"/>
-              <a:t>4/25/2021</a:t>
+              <a:t>4/27/2021</a:t>
             </a:fld>
             <a:endParaRPr lang="en-US"/>
           </a:p>
@@ -37502,6 +37553,197 @@
 </p:notesMaster>
 </file>
 
+<file path=ppt/notesSlides/notesSlide1.xml><?xml version="1.0" encoding="utf-8"?>
+<p:notes xmlns:a="http://schemas.openxmlformats.org/drawingml/2006/main" xmlns:r="http://schemas.openxmlformats.org/officeDocument/2006/relationships" xmlns:p="http://schemas.openxmlformats.org/presentationml/2006/main">
+  <p:cSld>
+    <p:spTree>
+      <p:nvGrpSpPr>
+        <p:cNvPr id="1" name=""/>
+        <p:cNvGrpSpPr/>
+        <p:nvPr/>
+      </p:nvGrpSpPr>
+      <p:grpSpPr>
+        <a:xfrm>
+          <a:off x="0" y="0"/>
+          <a:ext cx="0" cy="0"/>
+          <a:chOff x="0" y="0"/>
+          <a:chExt cx="0" cy="0"/>
+        </a:xfrm>
+      </p:grpSpPr>
+      <p:sp>
+        <p:nvSpPr>
+          <p:cNvPr id="2" name="Slide Image Placeholder 1"/>
+          <p:cNvSpPr>
+            <a:spLocks noGrp="1" noRot="1" noChangeAspect="1"/>
+          </p:cNvSpPr>
+          <p:nvPr>
+            <p:ph type="sldImg"/>
+          </p:nvPr>
+        </p:nvSpPr>
+        <p:spPr/>
+      </p:sp>
+      <p:sp>
+        <p:nvSpPr>
+          <p:cNvPr id="3" name="Notes Placeholder 2"/>
+          <p:cNvSpPr>
+            <a:spLocks noGrp="1"/>
+          </p:cNvSpPr>
+          <p:nvPr>
+            <p:ph type="body" idx="1"/>
+          </p:nvPr>
+        </p:nvSpPr>
+        <p:spPr/>
+        <p:txBody>
+          <a:bodyPr/>
+          <a:lstStyle/>
+          <a:p>
+            <a:pPr marL="0" marR="0" lvl="0" indent="0" algn="l" defTabSz="914400" rtl="0" eaLnBrk="1" fontAlgn="auto" latinLnBrk="0" hangingPunct="1">
+              <a:lnSpc>
+                <a:spcPct val="100000"/>
+              </a:lnSpc>
+              <a:spcBef>
+                <a:spcPts val="0"/>
+              </a:spcBef>
+              <a:spcAft>
+                <a:spcPts val="0"/>
+              </a:spcAft>
+              <a:buClrTx/>
+              <a:buSzTx/>
+              <a:buFontTx/>
+              <a:buNone/>
+              <a:tabLst/>
+              <a:defRPr/>
+            </a:pPr>
+            <a:r>
+              <a:rPr lang="en-US" dirty="0"/>
+              <a:t>Don’t spend more than 1-1.5 minute on any of the slides when presenting!</a:t>
+            </a:r>
+          </a:p>
+          <a:p>
+            <a:endParaRPr lang="LID4096" dirty="0"/>
+          </a:p>
+        </p:txBody>
+      </p:sp>
+      <p:sp>
+        <p:nvSpPr>
+          <p:cNvPr id="4" name="Slide Number Placeholder 3"/>
+          <p:cNvSpPr>
+            <a:spLocks noGrp="1"/>
+          </p:cNvSpPr>
+          <p:nvPr>
+            <p:ph type="sldNum" sz="quarter" idx="5"/>
+          </p:nvPr>
+        </p:nvSpPr>
+        <p:spPr/>
+        <p:txBody>
+          <a:bodyPr/>
+          <a:lstStyle/>
+          <a:p>
+            <a:fld id="{302E0936-0B3C-4D97-A5C9-00772284DCA7}" type="slidenum">
+              <a:rPr lang="en-US" smtClean="0"/>
+              <a:t>1</a:t>
+            </a:fld>
+            <a:endParaRPr lang="en-US"/>
+          </a:p>
+        </p:txBody>
+      </p:sp>
+    </p:spTree>
+    <p:extLst>
+      <p:ext uri="{BB962C8B-B14F-4D97-AF65-F5344CB8AC3E}">
+        <p14:creationId xmlns:p14="http://schemas.microsoft.com/office/powerpoint/2010/main" val="717151597"/>
+      </p:ext>
+    </p:extLst>
+  </p:cSld>
+  <p:clrMapOvr>
+    <a:masterClrMapping/>
+  </p:clrMapOvr>
+</p:notes>
+</file>
+
+<file path=ppt/notesSlides/notesSlide2.xml><?xml version="1.0" encoding="utf-8"?>
+<p:notes xmlns:a="http://schemas.openxmlformats.org/drawingml/2006/main" xmlns:r="http://schemas.openxmlformats.org/officeDocument/2006/relationships" xmlns:p="http://schemas.openxmlformats.org/presentationml/2006/main">
+  <p:cSld>
+    <p:spTree>
+      <p:nvGrpSpPr>
+        <p:cNvPr id="1" name=""/>
+        <p:cNvGrpSpPr/>
+        <p:nvPr/>
+      </p:nvGrpSpPr>
+      <p:grpSpPr>
+        <a:xfrm>
+          <a:off x="0" y="0"/>
+          <a:ext cx="0" cy="0"/>
+          <a:chOff x="0" y="0"/>
+          <a:chExt cx="0" cy="0"/>
+        </a:xfrm>
+      </p:grpSpPr>
+      <p:sp>
+        <p:nvSpPr>
+          <p:cNvPr id="2" name="Slide Image Placeholder 1"/>
+          <p:cNvSpPr>
+            <a:spLocks noGrp="1" noRot="1" noChangeAspect="1"/>
+          </p:cNvSpPr>
+          <p:nvPr>
+            <p:ph type="sldImg"/>
+          </p:nvPr>
+        </p:nvSpPr>
+        <p:spPr/>
+      </p:sp>
+      <p:sp>
+        <p:nvSpPr>
+          <p:cNvPr id="3" name="Notes Placeholder 2"/>
+          <p:cNvSpPr>
+            <a:spLocks noGrp="1"/>
+          </p:cNvSpPr>
+          <p:nvPr>
+            <p:ph type="body" idx="1"/>
+          </p:nvPr>
+        </p:nvSpPr>
+        <p:spPr/>
+        <p:txBody>
+          <a:bodyPr/>
+          <a:lstStyle/>
+          <a:p>
+            <a:endParaRPr lang="LID4096" dirty="0"/>
+          </a:p>
+        </p:txBody>
+      </p:sp>
+      <p:sp>
+        <p:nvSpPr>
+          <p:cNvPr id="4" name="Slide Number Placeholder 3"/>
+          <p:cNvSpPr>
+            <a:spLocks noGrp="1"/>
+          </p:cNvSpPr>
+          <p:nvPr>
+            <p:ph type="sldNum" sz="quarter" idx="5"/>
+          </p:nvPr>
+        </p:nvSpPr>
+        <p:spPr/>
+        <p:txBody>
+          <a:bodyPr/>
+          <a:lstStyle/>
+          <a:p>
+            <a:fld id="{302E0936-0B3C-4D97-A5C9-00772284DCA7}" type="slidenum">
+              <a:rPr lang="en-US" smtClean="0"/>
+              <a:t>5</a:t>
+            </a:fld>
+            <a:endParaRPr lang="en-US"/>
+          </a:p>
+        </p:txBody>
+      </p:sp>
+    </p:spTree>
+    <p:extLst>
+      <p:ext uri="{BB962C8B-B14F-4D97-AF65-F5344CB8AC3E}">
+        <p14:creationId xmlns:p14="http://schemas.microsoft.com/office/powerpoint/2010/main" val="2260203338"/>
+      </p:ext>
+    </p:extLst>
+  </p:cSld>
+  <p:clrMapOvr>
+    <a:masterClrMapping/>
+  </p:clrMapOvr>
+</p:notes>
+</file>
+
 <file path=ppt/slideLayouts/slideLayout1.xml><?xml version="1.0" encoding="utf-8"?>
 <p:sldLayout xmlns:a="http://schemas.openxmlformats.org/drawingml/2006/main" xmlns:r="http://schemas.openxmlformats.org/officeDocument/2006/relationships" xmlns:p="http://schemas.openxmlformats.org/presentationml/2006/main" type="title" preserve="1">
   <p:cSld name="Title Slide">
@@ -37649,7 +37891,7 @@
           <a:p>
             <a:fld id="{0A7875FD-8716-47D3-9886-2F92C8F5C61E}" type="datetime1">
               <a:rPr lang="en-US" smtClean="0"/>
-              <a:t>4/25/2021</a:t>
+              <a:t>4/27/2021</a:t>
             </a:fld>
             <a:endParaRPr lang="en-US"/>
           </a:p>
@@ -37847,7 +38089,7 @@
           <a:p>
             <a:fld id="{CBC246D8-30A6-4261-9D6B-186224F201A9}" type="datetime1">
               <a:rPr lang="en-US" smtClean="0"/>
-              <a:t>4/25/2021</a:t>
+              <a:t>4/27/2021</a:t>
             </a:fld>
             <a:endParaRPr lang="en-US"/>
           </a:p>
@@ -38055,7 +38297,7 @@
           <a:p>
             <a:fld id="{1F502448-BF01-4B13-82E3-1DE86CF2D44D}" type="datetime1">
               <a:rPr lang="en-US" smtClean="0"/>
-              <a:t>4/25/2021</a:t>
+              <a:t>4/27/2021</a:t>
             </a:fld>
             <a:endParaRPr lang="en-US"/>
           </a:p>
@@ -38253,7 +38495,7 @@
           <a:p>
             <a:fld id="{23D96705-4AEE-4650-867D-2D619A3A57E3}" type="datetime1">
               <a:rPr lang="en-US" smtClean="0"/>
-              <a:t>4/25/2021</a:t>
+              <a:t>4/27/2021</a:t>
             </a:fld>
             <a:endParaRPr lang="en-US"/>
           </a:p>
@@ -38528,7 +38770,7 @@
           <a:p>
             <a:fld id="{494B39AE-7804-44F5-B1C4-AA7A9C70E679}" type="datetime1">
               <a:rPr lang="en-US" smtClean="0"/>
-              <a:t>4/25/2021</a:t>
+              <a:t>4/27/2021</a:t>
             </a:fld>
             <a:endParaRPr lang="en-US"/>
           </a:p>
@@ -38793,7 +39035,7 @@
           <a:p>
             <a:fld id="{550AF2A9-AACF-44C7-8168-71B6980EF9B4}" type="datetime1">
               <a:rPr lang="en-US" smtClean="0"/>
-              <a:t>4/25/2021</a:t>
+              <a:t>4/27/2021</a:t>
             </a:fld>
             <a:endParaRPr lang="en-US"/>
           </a:p>
@@ -39205,7 +39447,7 @@
           <a:p>
             <a:fld id="{9A17C0A9-C769-4832-B7DA-AD9C931DDBEC}" type="datetime1">
               <a:rPr lang="en-US" smtClean="0"/>
-              <a:t>4/25/2021</a:t>
+              <a:t>4/27/2021</a:t>
             </a:fld>
             <a:endParaRPr lang="en-US"/>
           </a:p>
@@ -39346,7 +39588,7 @@
           <a:p>
             <a:fld id="{4ED97DAB-34B8-4596-A59E-AE6DE2187033}" type="datetime1">
               <a:rPr lang="en-US" smtClean="0"/>
-              <a:t>4/25/2021</a:t>
+              <a:t>4/27/2021</a:t>
             </a:fld>
             <a:endParaRPr lang="en-US"/>
           </a:p>
@@ -39459,7 +39701,7 @@
           <a:p>
             <a:fld id="{566787DD-0855-403D-A19B-055BC2F16C13}" type="datetime1">
               <a:rPr lang="en-US" smtClean="0"/>
-              <a:t>4/25/2021</a:t>
+              <a:t>4/27/2021</a:t>
             </a:fld>
             <a:endParaRPr lang="en-US"/>
           </a:p>
@@ -39770,7 +40012,7 @@
           <a:p>
             <a:fld id="{C2EE06A8-7DFA-44EC-88A9-9690E8846AAB}" type="datetime1">
               <a:rPr lang="en-US" smtClean="0"/>
-              <a:t>4/25/2021</a:t>
+              <a:t>4/27/2021</a:t>
             </a:fld>
             <a:endParaRPr lang="en-US"/>
           </a:p>
@@ -40058,7 +40300,7 @@
           <a:p>
             <a:fld id="{7A2855AE-6849-47BA-97C4-0B1AB9EDFCF4}" type="datetime1">
               <a:rPr lang="en-US" smtClean="0"/>
-              <a:t>4/25/2021</a:t>
+              <a:t>4/27/2021</a:t>
             </a:fld>
             <a:endParaRPr lang="en-US"/>
           </a:p>
@@ -40299,7 +40541,7 @@
           <a:p>
             <a:fld id="{79DBD6A4-C22E-4E3E-9874-95870EBF4AD4}" type="datetime1">
               <a:rPr lang="en-US" smtClean="0"/>
-              <a:t>4/25/2021</a:t>
+              <a:t>4/27/2021</a:t>
             </a:fld>
             <a:endParaRPr lang="en-US"/>
           </a:p>
@@ -40703,162 +40945,6 @@
 <file path=ppt/slides/slide1.xml><?xml version="1.0" encoding="utf-8"?>
 <p:sld xmlns:a="http://schemas.openxmlformats.org/drawingml/2006/main" xmlns:r="http://schemas.openxmlformats.org/officeDocument/2006/relationships" xmlns:p="http://schemas.openxmlformats.org/presentationml/2006/main">
   <p:cSld>
-    <p:bg>
-      <p:bgPr>
-        <a:solidFill>
-          <a:schemeClr val="accent2">
-            <a:lumMod val="60000"/>
-            <a:lumOff val="40000"/>
-          </a:schemeClr>
-        </a:solidFill>
-        <a:effectLst/>
-      </p:bgPr>
-    </p:bg>
-    <p:spTree>
-      <p:nvGrpSpPr>
-        <p:cNvPr id="1" name=""/>
-        <p:cNvGrpSpPr/>
-        <p:nvPr/>
-      </p:nvGrpSpPr>
-      <p:grpSpPr>
-        <a:xfrm>
-          <a:off x="0" y="0"/>
-          <a:ext cx="0" cy="0"/>
-          <a:chOff x="0" y="0"/>
-          <a:chExt cx="0" cy="0"/>
-        </a:xfrm>
-      </p:grpSpPr>
-      <p:sp>
-        <p:nvSpPr>
-          <p:cNvPr id="2" name="Title 1">
-            <a:extLst>
-              <a:ext uri="{FF2B5EF4-FFF2-40B4-BE49-F238E27FC236}">
-                <a16:creationId xmlns:a16="http://schemas.microsoft.com/office/drawing/2014/main" id="{2920EAE2-35F4-45A0-8612-EAF023C30793}"/>
-              </a:ext>
-            </a:extLst>
-          </p:cNvPr>
-          <p:cNvSpPr>
-            <a:spLocks noGrp="1"/>
-          </p:cNvSpPr>
-          <p:nvPr>
-            <p:ph type="title"/>
-          </p:nvPr>
-        </p:nvSpPr>
-        <p:spPr/>
-        <p:txBody>
-          <a:bodyPr/>
-          <a:lstStyle/>
-          <a:p>
-            <a:r>
-              <a:rPr lang="en-US" dirty="0"/>
-              <a:t>How to use this template?</a:t>
-            </a:r>
-          </a:p>
-        </p:txBody>
-      </p:sp>
-      <p:sp>
-        <p:nvSpPr>
-          <p:cNvPr id="3" name="Content Placeholder 2">
-            <a:extLst>
-              <a:ext uri="{FF2B5EF4-FFF2-40B4-BE49-F238E27FC236}">
-                <a16:creationId xmlns:a16="http://schemas.microsoft.com/office/drawing/2014/main" id="{3A9519C0-CBFC-4074-9E60-6C2702024909}"/>
-              </a:ext>
-            </a:extLst>
-          </p:cNvPr>
-          <p:cNvSpPr>
-            <a:spLocks noGrp="1"/>
-          </p:cNvSpPr>
-          <p:nvPr>
-            <p:ph idx="1"/>
-          </p:nvPr>
-        </p:nvSpPr>
-        <p:spPr/>
-        <p:txBody>
-          <a:bodyPr/>
-          <a:lstStyle/>
-          <a:p>
-            <a:r>
-              <a:rPr lang="en-US" dirty="0"/>
-              <a:t>Use this template and don’t add slides or reorder them (or if you prefer Presenter/Latex, copy each slide over)</a:t>
-            </a:r>
-          </a:p>
-          <a:p>
-            <a:r>
-              <a:rPr lang="en-US" dirty="0"/>
-              <a:t>Try to answer all points in the slides!</a:t>
-            </a:r>
-          </a:p>
-          <a:p>
-            <a:r>
-              <a:rPr lang="en-US" dirty="0"/>
-              <a:t>Make sure that graphs are readable! You can copy them from the report if they fit well, but I suggest recreating them here.</a:t>
-            </a:r>
-          </a:p>
-          <a:p>
-            <a:r>
-              <a:rPr lang="en-US" dirty="0"/>
-              <a:t>Don’t spend more than 1-1.5 minute on any of the slides when presenting!</a:t>
-            </a:r>
-          </a:p>
-          <a:p>
-            <a:endParaRPr lang="en-US" dirty="0"/>
-          </a:p>
-          <a:p>
-            <a:r>
-              <a:rPr lang="en-US" i="1" dirty="0"/>
-              <a:t>Before submitting, remove this slide from the presentation.</a:t>
-            </a:r>
-          </a:p>
-          <a:p>
-            <a:endParaRPr lang="en-US" dirty="0"/>
-          </a:p>
-        </p:txBody>
-      </p:sp>
-      <p:sp>
-        <p:nvSpPr>
-          <p:cNvPr id="4" name="Slide Number Placeholder 3">
-            <a:extLst>
-              <a:ext uri="{FF2B5EF4-FFF2-40B4-BE49-F238E27FC236}">
-                <a16:creationId xmlns:a16="http://schemas.microsoft.com/office/drawing/2014/main" id="{76C441A9-43E1-4185-BC56-A5172B784C65}"/>
-              </a:ext>
-            </a:extLst>
-          </p:cNvPr>
-          <p:cNvSpPr>
-            <a:spLocks noGrp="1"/>
-          </p:cNvSpPr>
-          <p:nvPr>
-            <p:ph type="sldNum" sz="quarter" idx="12"/>
-          </p:nvPr>
-        </p:nvSpPr>
-        <p:spPr/>
-        <p:txBody>
-          <a:bodyPr/>
-          <a:lstStyle/>
-          <a:p>
-            <a:fld id="{EE3B441A-A17E-4EEF-A64F-38DFA00D02CA}" type="slidenum">
-              <a:rPr lang="en-US" smtClean="0"/>
-              <a:t>1</a:t>
-            </a:fld>
-            <a:endParaRPr lang="en-US"/>
-          </a:p>
-        </p:txBody>
-      </p:sp>
-    </p:spTree>
-    <p:extLst>
-      <p:ext uri="{BB962C8B-B14F-4D97-AF65-F5344CB8AC3E}">
-        <p14:creationId xmlns:p14="http://schemas.microsoft.com/office/powerpoint/2010/main" val="3951810723"/>
-      </p:ext>
-    </p:extLst>
-  </p:cSld>
-  <p:clrMapOvr>
-    <a:masterClrMapping/>
-  </p:clrMapOvr>
-</p:sld>
-</file>
-
-<file path=ppt/slides/slide2.xml><?xml version="1.0" encoding="utf-8"?>
-<p:sld xmlns:a="http://schemas.openxmlformats.org/drawingml/2006/main" xmlns:r="http://schemas.openxmlformats.org/officeDocument/2006/relationships" xmlns:p="http://schemas.openxmlformats.org/presentationml/2006/main">
-  <p:cSld>
     <p:spTree>
       <p:nvGrpSpPr>
         <p:cNvPr id="1" name=""/>
@@ -40994,7 +41080,7 @@
           <a:p>
             <a:fld id="{EE3B441A-A17E-4EEF-A64F-38DFA00D02CA}" type="slidenum">
               <a:rPr lang="en-US" smtClean="0"/>
-              <a:t>2</a:t>
+              <a:t>1</a:t>
             </a:fld>
             <a:endParaRPr lang="en-US"/>
           </a:p>
@@ -41013,7 +41099,7 @@
 </p:sld>
 </file>
 
-<file path=ppt/slides/slide3.xml><?xml version="1.0" encoding="utf-8"?>
+<file path=ppt/slides/slide2.xml><?xml version="1.0" encoding="utf-8"?>
 <p:sld xmlns:a="http://schemas.openxmlformats.org/drawingml/2006/main" xmlns:r="http://schemas.openxmlformats.org/officeDocument/2006/relationships" xmlns:p="http://schemas.openxmlformats.org/presentationml/2006/main">
   <p:cSld>
     <p:spTree>
@@ -41074,14 +41160,46 @@
             <p:ph idx="1"/>
           </p:nvPr>
         </p:nvSpPr>
-        <p:spPr/>
+        <p:spPr>
+          <a:xfrm>
+            <a:off x="838200" y="1825625"/>
+            <a:ext cx="10728158" cy="4351338"/>
+          </a:xfrm>
+        </p:spPr>
         <p:txBody>
           <a:bodyPr/>
           <a:lstStyle/>
           <a:p>
             <a:r>
+              <a:rPr lang="en-GB" dirty="0" err="1"/>
+              <a:t>ListOf</a:t>
+            </a:r>
+            <a:r>
+              <a:rPr lang="en-GB" dirty="0"/>
+              <a:t>([words] [&lt;tag </a:t>
+            </a:r>
+            <a:r>
+              <a:rPr lang="en-GB" dirty="0" err="1"/>
+              <a:t>listOf</a:t>
+            </a:r>
+            <a:r>
+              <a:rPr lang="en-GB" dirty="0"/>
+              <a:t>([attributes] [</a:t>
+            </a:r>
+            <a:r>
+              <a:rPr lang="en-GB" dirty="0" err="1"/>
+              <a:t>titleAttribute</a:t>
+            </a:r>
+            <a:r>
+              <a:rPr lang="en-GB" dirty="0"/>
+              <a:t>] [attributes])[&gt;]])</a:t>
+            </a:r>
+            <a:endParaRPr lang="en-US" dirty="0"/>
+          </a:p>
+          <a:p>
+            <a:r>
               <a:rPr lang="en-US" dirty="0"/>
-              <a:t>Split at ‘&gt;’  giving list of “words &lt;tag info”</a:t>
+              <a:t>Split at ‘&gt;’</a:t>
             </a:r>
           </a:p>
           <a:p>
@@ -41089,6 +41207,27 @@
               <a:rPr lang="en-US" dirty="0"/>
               <a:t>For each: </a:t>
             </a:r>
+            <a:r>
+              <a:rPr lang="en-GB" dirty="0"/>
+              <a:t>[words] [&lt;tag </a:t>
+            </a:r>
+            <a:r>
+              <a:rPr lang="en-GB" dirty="0" err="1"/>
+              <a:t>listOf</a:t>
+            </a:r>
+            <a:r>
+              <a:rPr lang="en-GB" dirty="0"/>
+              <a:t>([attributes] [</a:t>
+            </a:r>
+            <a:r>
+              <a:rPr lang="en-GB" dirty="0" err="1"/>
+              <a:t>titleAttribute</a:t>
+            </a:r>
+            <a:r>
+              <a:rPr lang="en-GB" dirty="0"/>
+              <a:t>] [attributes])[&gt;]</a:t>
+            </a:r>
+            <a:endParaRPr lang="en-US" dirty="0"/>
           </a:p>
           <a:p>
             <a:pPr lvl="1"/>
@@ -41136,13 +41275,22 @@
             </a:r>
           </a:p>
           <a:p>
+            <a:pPr lvl="1"/>
+            <a:r>
+              <a:rPr lang="en-US" dirty="0"/>
+              <a:t>Repeat if multiple titles </a:t>
+            </a:r>
+            <a:r>
+              <a:rPr lang="en-US"/>
+              <a:t>are there</a:t>
+            </a:r>
+            <a:endParaRPr lang="en-US" dirty="0"/>
+          </a:p>
+          <a:p>
             <a:pPr marL="457200" lvl="1" indent="0">
               <a:buNone/>
             </a:pPr>
-            <a:r>
-              <a:rPr lang="en-US" dirty="0"/>
-              <a:t>	….</a:t>
-            </a:r>
+            <a:endParaRPr lang="en-US" dirty="0"/>
           </a:p>
           <a:p>
             <a:pPr marL="457200" lvl="1" indent="0">
@@ -41175,7 +41323,7 @@
           <a:p>
             <a:fld id="{EE3B441A-A17E-4EEF-A64F-38DFA00D02CA}" type="slidenum">
               <a:rPr lang="en-US" smtClean="0"/>
-              <a:t>3</a:t>
+              <a:t>2</a:t>
             </a:fld>
             <a:endParaRPr lang="en-US"/>
           </a:p>
@@ -41194,7 +41342,7 @@
 </p:sld>
 </file>
 
-<file path=ppt/slides/slide4.xml><?xml version="1.0" encoding="utf-8"?>
+<file path=ppt/slides/slide3.xml><?xml version="1.0" encoding="utf-8"?>
 <p:sld xmlns:a="http://schemas.openxmlformats.org/drawingml/2006/main" xmlns:r="http://schemas.openxmlformats.org/officeDocument/2006/relationships" xmlns:p="http://schemas.openxmlformats.org/presentationml/2006/main">
   <p:cSld>
     <p:spTree>
@@ -41322,7 +41470,7 @@
           <a:p>
             <a:fld id="{EE3B441A-A17E-4EEF-A64F-38DFA00D02CA}" type="slidenum">
               <a:rPr lang="en-US" smtClean="0"/>
-              <a:t>4</a:t>
+              <a:t>3</a:t>
             </a:fld>
             <a:endParaRPr lang="en-US"/>
           </a:p>
@@ -41388,7 +41536,7 @@
 </p:sld>
 </file>
 
-<file path=ppt/slides/slide5.xml><?xml version="1.0" encoding="utf-8"?>
+<file path=ppt/slides/slide4.xml><?xml version="1.0" encoding="utf-8"?>
 <p:sld xmlns:a="http://schemas.openxmlformats.org/drawingml/2006/main" xmlns:r="http://schemas.openxmlformats.org/officeDocument/2006/relationships" xmlns:p="http://schemas.openxmlformats.org/presentationml/2006/main">
   <p:cSld>
     <p:spTree>
@@ -41524,7 +41672,7 @@
           <a:p>
             <a:fld id="{EE3B441A-A17E-4EEF-A64F-38DFA00D02CA}" type="slidenum">
               <a:rPr lang="en-US" smtClean="0"/>
-              <a:t>5</a:t>
+              <a:t>4</a:t>
             </a:fld>
             <a:endParaRPr lang="en-US"/>
           </a:p>
@@ -41661,7 +41809,7 @@
 </p:sld>
 </file>
 
-<file path=ppt/slides/slide6.xml><?xml version="1.0" encoding="utf-8"?>
+<file path=ppt/slides/slide5.xml><?xml version="1.0" encoding="utf-8"?>
 <p:sld xmlns:a="http://schemas.openxmlformats.org/drawingml/2006/main" xmlns:r="http://schemas.openxmlformats.org/officeDocument/2006/relationships" xmlns:p="http://schemas.openxmlformats.org/presentationml/2006/main">
   <p:cSld>
     <p:spTree>
@@ -41724,8 +41872,8 @@
         </p:nvSpPr>
         <p:spPr>
           <a:xfrm>
-            <a:off x="76616" y="1307185"/>
-            <a:ext cx="4700944" cy="1830562"/>
+            <a:off x="604643" y="1342302"/>
+            <a:ext cx="6187551" cy="1830562"/>
           </a:xfrm>
         </p:spPr>
         <p:txBody>
@@ -41737,7 +41885,7 @@
             </a:pPr>
             <a:r>
               <a:rPr lang="en-US" dirty="0"/>
-              <a:t>Throughput with increasing number of clients </a:t>
+              <a:t>Throughput with increasing number of clients increases slightly</a:t>
             </a:r>
           </a:p>
           <a:p>
@@ -41777,7 +41925,7 @@
           <a:p>
             <a:fld id="{EE3B441A-A17E-4EEF-A64F-38DFA00D02CA}" type="slidenum">
               <a:rPr lang="en-US" smtClean="0"/>
-              <a:t>6</a:t>
+              <a:t>5</a:t>
             </a:fld>
             <a:endParaRPr lang="en-US"/>
           </a:p>
@@ -41798,18 +41946,18 @@
           <p:nvPr>
             <p:extLst>
               <p:ext uri="{D42A27DB-BD31-4B8C-83A1-F6EECF244321}">
-                <p14:modId xmlns:p14="http://schemas.microsoft.com/office/powerpoint/2010/main" val="2807219624"/>
+                <p14:modId xmlns:p14="http://schemas.microsoft.com/office/powerpoint/2010/main" val="472445155"/>
               </p:ext>
             </p:extLst>
           </p:nvPr>
         </p:nvGraphicFramePr>
         <p:xfrm>
-          <a:off x="4480675" y="89208"/>
-          <a:ext cx="4195115" cy="2051959"/>
+          <a:off x="6792195" y="0"/>
+          <a:ext cx="5389555" cy="2636196"/>
         </p:xfrm>
         <a:graphic>
           <a:graphicData uri="http://schemas.openxmlformats.org/drawingml/2006/chart">
-            <c:chart xmlns:c="http://schemas.openxmlformats.org/drawingml/2006/chart" xmlns:r="http://schemas.openxmlformats.org/officeDocument/2006/relationships" r:id="rId2"/>
+            <c:chart xmlns:c="http://schemas.openxmlformats.org/drawingml/2006/chart" xmlns:r="http://schemas.openxmlformats.org/officeDocument/2006/relationships" r:id="rId3"/>
           </a:graphicData>
         </a:graphic>
       </p:graphicFrame>
@@ -41828,18 +41976,18 @@
           <p:nvPr>
             <p:extLst>
               <p:ext uri="{D42A27DB-BD31-4B8C-83A1-F6EECF244321}">
-                <p14:modId xmlns:p14="http://schemas.microsoft.com/office/powerpoint/2010/main" val="694364243"/>
+                <p14:modId xmlns:p14="http://schemas.microsoft.com/office/powerpoint/2010/main" val="505391100"/>
               </p:ext>
             </p:extLst>
           </p:nvPr>
         </p:nvGraphicFramePr>
         <p:xfrm>
-          <a:off x="4227761" y="3086013"/>
+          <a:off x="4227764" y="3182690"/>
           <a:ext cx="3801771" cy="1830562"/>
         </p:xfrm>
         <a:graphic>
           <a:graphicData uri="http://schemas.openxmlformats.org/drawingml/2006/chart">
-            <c:chart xmlns:c="http://schemas.openxmlformats.org/drawingml/2006/chart" xmlns:r="http://schemas.openxmlformats.org/officeDocument/2006/relationships" r:id="rId3"/>
+            <c:chart xmlns:c="http://schemas.openxmlformats.org/drawingml/2006/chart" xmlns:r="http://schemas.openxmlformats.org/officeDocument/2006/relationships" r:id="rId4"/>
           </a:graphicData>
         </a:graphic>
       </p:graphicFrame>
@@ -41858,18 +42006,18 @@
           <p:nvPr>
             <p:extLst>
               <p:ext uri="{D42A27DB-BD31-4B8C-83A1-F6EECF244321}">
-                <p14:modId xmlns:p14="http://schemas.microsoft.com/office/powerpoint/2010/main" val="1408771550"/>
+                <p14:modId xmlns:p14="http://schemas.microsoft.com/office/powerpoint/2010/main" val="1392943653"/>
               </p:ext>
             </p:extLst>
           </p:nvPr>
         </p:nvGraphicFramePr>
         <p:xfrm>
-          <a:off x="8390229" y="3086013"/>
+          <a:off x="8379979" y="3164764"/>
           <a:ext cx="3801771" cy="1830562"/>
         </p:xfrm>
         <a:graphic>
           <a:graphicData uri="http://schemas.openxmlformats.org/drawingml/2006/chart">
-            <c:chart xmlns:c="http://schemas.openxmlformats.org/drawingml/2006/chart" xmlns:r="http://schemas.openxmlformats.org/officeDocument/2006/relationships" r:id="rId4"/>
+            <c:chart xmlns:c="http://schemas.openxmlformats.org/drawingml/2006/chart" xmlns:r="http://schemas.openxmlformats.org/officeDocument/2006/relationships" r:id="rId5"/>
           </a:graphicData>
         </a:graphic>
       </p:graphicFrame>
@@ -41888,18 +42036,18 @@
           <p:nvPr>
             <p:extLst>
               <p:ext uri="{D42A27DB-BD31-4B8C-83A1-F6EECF244321}">
-                <p14:modId xmlns:p14="http://schemas.microsoft.com/office/powerpoint/2010/main" val="3149370417"/>
+                <p14:modId xmlns:p14="http://schemas.microsoft.com/office/powerpoint/2010/main" val="2048433553"/>
               </p:ext>
             </p:extLst>
           </p:nvPr>
         </p:nvGraphicFramePr>
         <p:xfrm>
-          <a:off x="-4577" y="5027438"/>
-          <a:ext cx="3699670" cy="1830562"/>
+          <a:off x="-4577" y="5095114"/>
+          <a:ext cx="3266761" cy="1762886"/>
         </p:xfrm>
         <a:graphic>
           <a:graphicData uri="http://schemas.openxmlformats.org/drawingml/2006/chart">
-            <c:chart xmlns:c="http://schemas.openxmlformats.org/drawingml/2006/chart" xmlns:r="http://schemas.openxmlformats.org/officeDocument/2006/relationships" r:id="rId5"/>
+            <c:chart xmlns:c="http://schemas.openxmlformats.org/drawingml/2006/chart" xmlns:r="http://schemas.openxmlformats.org/officeDocument/2006/relationships" r:id="rId6"/>
           </a:graphicData>
         </a:graphic>
       </p:graphicFrame>
@@ -41918,18 +42066,18 @@
           <p:nvPr>
             <p:extLst>
               <p:ext uri="{D42A27DB-BD31-4B8C-83A1-F6EECF244321}">
-                <p14:modId xmlns:p14="http://schemas.microsoft.com/office/powerpoint/2010/main" val="1423805818"/>
+                <p14:modId xmlns:p14="http://schemas.microsoft.com/office/powerpoint/2010/main" val="4157506832"/>
               </p:ext>
             </p:extLst>
           </p:nvPr>
         </p:nvGraphicFramePr>
         <p:xfrm>
-          <a:off x="4238014" y="5032375"/>
-          <a:ext cx="3791518" cy="1825625"/>
+          <a:off x="2955116" y="5095114"/>
+          <a:ext cx="3327625" cy="1766708"/>
         </p:xfrm>
         <a:graphic>
           <a:graphicData uri="http://schemas.openxmlformats.org/drawingml/2006/chart">
-            <c:chart xmlns:c="http://schemas.openxmlformats.org/drawingml/2006/chart" xmlns:r="http://schemas.openxmlformats.org/officeDocument/2006/relationships" r:id="rId6"/>
+            <c:chart xmlns:c="http://schemas.openxmlformats.org/drawingml/2006/chart" xmlns:r="http://schemas.openxmlformats.org/officeDocument/2006/relationships" r:id="rId7"/>
           </a:graphicData>
         </a:graphic>
       </p:graphicFrame>
@@ -41948,18 +42096,18 @@
           <p:nvPr>
             <p:extLst>
               <p:ext uri="{D42A27DB-BD31-4B8C-83A1-F6EECF244321}">
-                <p14:modId xmlns:p14="http://schemas.microsoft.com/office/powerpoint/2010/main" val="3677703211"/>
+                <p14:modId xmlns:p14="http://schemas.microsoft.com/office/powerpoint/2010/main" val="2314873687"/>
               </p:ext>
             </p:extLst>
           </p:nvPr>
         </p:nvGraphicFramePr>
         <p:xfrm>
-          <a:off x="8390228" y="5027438"/>
-          <a:ext cx="3801771" cy="1830562"/>
+          <a:off x="5996126" y="5095113"/>
+          <a:ext cx="3327626" cy="1766708"/>
         </p:xfrm>
         <a:graphic>
           <a:graphicData uri="http://schemas.openxmlformats.org/drawingml/2006/chart">
-            <c:chart xmlns:c="http://schemas.openxmlformats.org/drawingml/2006/chart" xmlns:r="http://schemas.openxmlformats.org/officeDocument/2006/relationships" r:id="rId7"/>
+            <c:chart xmlns:c="http://schemas.openxmlformats.org/drawingml/2006/chart" xmlns:r="http://schemas.openxmlformats.org/officeDocument/2006/relationships" r:id="rId8"/>
           </a:graphicData>
         </a:graphic>
       </p:graphicFrame>
@@ -41978,18 +42126,18 @@
           <p:nvPr>
             <p:extLst>
               <p:ext uri="{D42A27DB-BD31-4B8C-83A1-F6EECF244321}">
-                <p14:modId xmlns:p14="http://schemas.microsoft.com/office/powerpoint/2010/main" val="1860204423"/>
+                <p14:modId xmlns:p14="http://schemas.microsoft.com/office/powerpoint/2010/main" val="2458495082"/>
               </p:ext>
             </p:extLst>
           </p:nvPr>
         </p:nvGraphicFramePr>
         <p:xfrm>
-          <a:off x="8378904" y="1307185"/>
-          <a:ext cx="3801771" cy="1830562"/>
+          <a:off x="9018951" y="5091291"/>
+          <a:ext cx="3162799" cy="1766708"/>
         </p:xfrm>
         <a:graphic>
           <a:graphicData uri="http://schemas.openxmlformats.org/drawingml/2006/chart">
-            <c:chart xmlns:c="http://schemas.openxmlformats.org/drawingml/2006/chart" xmlns:r="http://schemas.openxmlformats.org/officeDocument/2006/relationships" r:id="rId8"/>
+            <c:chart xmlns:c="http://schemas.openxmlformats.org/drawingml/2006/chart" xmlns:r="http://schemas.openxmlformats.org/officeDocument/2006/relationships" r:id="rId9"/>
           </a:graphicData>
         </a:graphic>
       </p:graphicFrame>
@@ -42008,18 +42156,18 @@
           <p:nvPr>
             <p:extLst>
               <p:ext uri="{D42A27DB-BD31-4B8C-83A1-F6EECF244321}">
-                <p14:modId xmlns:p14="http://schemas.microsoft.com/office/powerpoint/2010/main" val="187020965"/>
+                <p14:modId xmlns:p14="http://schemas.microsoft.com/office/powerpoint/2010/main" val="3360537374"/>
               </p:ext>
             </p:extLst>
           </p:nvPr>
         </p:nvGraphicFramePr>
         <p:xfrm>
-          <a:off x="-3" y="3136436"/>
+          <a:off x="0" y="3233113"/>
           <a:ext cx="3867065" cy="1862000"/>
         </p:xfrm>
         <a:graphic>
           <a:graphicData uri="http://schemas.openxmlformats.org/drawingml/2006/chart">
-            <c:chart xmlns:c="http://schemas.openxmlformats.org/drawingml/2006/chart" xmlns:r="http://schemas.openxmlformats.org/officeDocument/2006/relationships" r:id="rId9"/>
+            <c:chart xmlns:c="http://schemas.openxmlformats.org/drawingml/2006/chart" xmlns:r="http://schemas.openxmlformats.org/officeDocument/2006/relationships" r:id="rId10"/>
           </a:graphicData>
         </a:graphic>
       </p:graphicFrame>
@@ -42036,7 +42184,7 @@
 </p:sld>
 </file>
 
-<file path=ppt/slides/slide7.xml><?xml version="1.0" encoding="utf-8"?>
+<file path=ppt/slides/slide6.xml><?xml version="1.0" encoding="utf-8"?>
 <p:sld xmlns:a="http://schemas.openxmlformats.org/drawingml/2006/main" xmlns:r="http://schemas.openxmlformats.org/officeDocument/2006/relationships" xmlns:p="http://schemas.openxmlformats.org/presentationml/2006/main">
   <p:cSld>
     <p:spTree>
@@ -42099,17 +42247,26 @@
         </p:nvSpPr>
         <p:spPr>
           <a:xfrm>
-            <a:off x="838200" y="1825625"/>
+            <a:off x="826170" y="1825625"/>
             <a:ext cx="10515600" cy="1367556"/>
           </a:xfrm>
         </p:spPr>
         <p:txBody>
-          <a:bodyPr/>
+          <a:bodyPr>
+            <a:normAutofit lnSpcReduction="10000"/>
+          </a:bodyPr>
           <a:lstStyle/>
           <a:p>
             <a:r>
               <a:rPr lang="en-US" dirty="0"/>
-              <a:t>Spend time: serializing&gt;in queue&gt;cleaning&gt;word count</a:t>
+              <a:t>Message spends most time:</a:t>
+            </a:r>
+          </a:p>
+          <a:p>
+            <a:pPr lvl="1"/>
+            <a:r>
+              <a:rPr lang="en-US" dirty="0"/>
+              <a:t>serializing &gt; in queue &gt; cleaning &gt; word count</a:t>
             </a:r>
           </a:p>
           <a:p>
@@ -42143,7 +42300,7 @@
           <a:p>
             <a:fld id="{EE3B441A-A17E-4EEF-A64F-38DFA00D02CA}" type="slidenum">
               <a:rPr lang="en-US" smtClean="0"/>
-              <a:t>7</a:t>
+              <a:t>6</a:t>
             </a:fld>
             <a:endParaRPr lang="en-US"/>
           </a:p>
@@ -42190,7 +42347,7 @@
           <p:nvPr>
             <p:extLst>
               <p:ext uri="{D42A27DB-BD31-4B8C-83A1-F6EECF244321}">
-                <p14:modId xmlns:p14="http://schemas.microsoft.com/office/powerpoint/2010/main" val="3052286325"/>
+                <p14:modId xmlns:p14="http://schemas.microsoft.com/office/powerpoint/2010/main" val="3289236883"/>
               </p:ext>
             </p:extLst>
           </p:nvPr>
@@ -42205,6 +42362,53 @@
           </a:graphicData>
         </a:graphic>
       </p:graphicFrame>
+      <p:pic>
+        <p:nvPicPr>
+          <p:cNvPr id="1026" name="Picture 2">
+            <a:extLst>
+              <a:ext uri="{FF2B5EF4-FFF2-40B4-BE49-F238E27FC236}">
+                <a16:creationId xmlns:a16="http://schemas.microsoft.com/office/drawing/2014/main" id="{788ACA60-D1C4-4F2F-8351-CEF6BF2699F8}"/>
+              </a:ext>
+            </a:extLst>
+          </p:cNvPr>
+          <p:cNvPicPr>
+            <a:picLocks noChangeAspect="1" noChangeArrowheads="1"/>
+          </p:cNvPicPr>
+          <p:nvPr/>
+        </p:nvPicPr>
+        <p:blipFill>
+          <a:blip r:embed="rId4">
+            <a:extLst>
+              <a:ext uri="{28A0092B-C50C-407E-A947-70E740481C1C}">
+                <a14:useLocalDpi xmlns:a14="http://schemas.microsoft.com/office/drawing/2010/main" val="0"/>
+              </a:ext>
+            </a:extLst>
+          </a:blip>
+          <a:srcRect/>
+          <a:stretch>
+            <a:fillRect/>
+          </a:stretch>
+        </p:blipFill>
+        <p:spPr bwMode="auto">
+          <a:xfrm>
+            <a:off x="6791984" y="499256"/>
+            <a:ext cx="5387986" cy="1325563"/>
+          </a:xfrm>
+          <a:prstGeom prst="rect">
+            <a:avLst/>
+          </a:prstGeom>
+          <a:noFill/>
+          <a:extLst>
+            <a:ext uri="{909E8E84-426E-40DD-AFC4-6F175D3DCCD1}">
+              <a14:hiddenFill xmlns:a14="http://schemas.microsoft.com/office/drawing/2010/main">
+                <a:solidFill>
+                  <a:srgbClr val="FFFFFF"/>
+                </a:solidFill>
+              </a14:hiddenFill>
+            </a:ext>
+          </a:extLst>
+        </p:spPr>
+      </p:pic>
     </p:spTree>
     <p:extLst>
       <p:ext uri="{BB962C8B-B14F-4D97-AF65-F5344CB8AC3E}">
@@ -42218,7 +42422,7 @@
 </p:sld>
 </file>
 
-<file path=ppt/slides/slide8.xml><?xml version="1.0" encoding="utf-8"?>
+<file path=ppt/slides/slide7.xml><?xml version="1.0" encoding="utf-8"?>
 <p:sld xmlns:a="http://schemas.openxmlformats.org/drawingml/2006/main" xmlns:r="http://schemas.openxmlformats.org/officeDocument/2006/relationships" xmlns:p="http://schemas.openxmlformats.org/presentationml/2006/main">
   <p:cSld>
     <p:spTree>
@@ -42330,13 +42534,8 @@
             <a:pPr lvl="1"/>
             <a:r>
               <a:rPr lang="en-US" dirty="0"/>
-              <a:t>Outliers need to </a:t>
+              <a:t>Outliers need to be removed</a:t>
             </a:r>
-            <a:r>
-              <a:rPr lang="en-US"/>
-              <a:t>be removed</a:t>
-            </a:r>
-            <a:endParaRPr lang="en-US" dirty="0"/>
           </a:p>
           <a:p>
             <a:r>
@@ -42431,7 +42630,7 @@
           <a:p>
             <a:fld id="{EE3B441A-A17E-4EEF-A64F-38DFA00D02CA}" type="slidenum">
               <a:rPr lang="en-US" smtClean="0"/>
-              <a:t>8</a:t>
+              <a:t>7</a:t>
             </a:fld>
             <a:endParaRPr lang="en-US"/>
           </a:p>

</xml_diff>